<commit_message>
Post 2020-12 vote results
</commit_message>
<xml_diff>
--- a/slides/2020/09/2020-09-30-rcm-frm-procedures.pptx
+++ b/slides/2020/09/2020-09-30-rcm-frm-procedures.pptx
@@ -265,7 +265,7 @@
           <a:p>
             <a:fld id="{35E2408E-A087-8D43-A497-FDCC91DD0CD2}" type="datetimeFigureOut">
               <a:rPr lang="en-US" smtClean="0"/>
-              <a:t>10/7/20</a:t>
+              <a:t>12/10/20</a:t>
             </a:fld>
             <a:endParaRPr lang="en-US"/>
           </a:p>
@@ -476,7 +476,7 @@
           <a:p>
             <a:fld id="{35E2408E-A087-8D43-A497-FDCC91DD0CD2}" type="datetimeFigureOut">
               <a:rPr lang="en-US" smtClean="0"/>
-              <a:t>10/7/20</a:t>
+              <a:t>12/10/20</a:t>
             </a:fld>
             <a:endParaRPr lang="en-US"/>
           </a:p>
@@ -691,7 +691,7 @@
           <a:p>
             <a:fld id="{35E2408E-A087-8D43-A497-FDCC91DD0CD2}" type="datetimeFigureOut">
               <a:rPr lang="en-US" smtClean="0"/>
-              <a:t>10/7/20</a:t>
+              <a:t>12/10/20</a:t>
             </a:fld>
             <a:endParaRPr lang="en-US"/>
           </a:p>
@@ -892,7 +892,7 @@
           <a:p>
             <a:fld id="{35E2408E-A087-8D43-A497-FDCC91DD0CD2}" type="datetimeFigureOut">
               <a:rPr lang="en-US" smtClean="0"/>
-              <a:t>10/7/20</a:t>
+              <a:t>12/10/20</a:t>
             </a:fld>
             <a:endParaRPr lang="en-US"/>
           </a:p>
@@ -1171,7 +1171,7 @@
           <a:p>
             <a:fld id="{35E2408E-A087-8D43-A497-FDCC91DD0CD2}" type="datetimeFigureOut">
               <a:rPr lang="en-US" smtClean="0"/>
-              <a:t>10/7/20</a:t>
+              <a:t>12/10/20</a:t>
             </a:fld>
             <a:endParaRPr lang="en-US"/>
           </a:p>
@@ -1439,7 +1439,7 @@
           <a:p>
             <a:fld id="{35E2408E-A087-8D43-A497-FDCC91DD0CD2}" type="datetimeFigureOut">
               <a:rPr lang="en-US" smtClean="0"/>
-              <a:t>10/7/20</a:t>
+              <a:t>12/10/20</a:t>
             </a:fld>
             <a:endParaRPr lang="en-US"/>
           </a:p>
@@ -1860,7 +1860,7 @@
           <a:p>
             <a:fld id="{35E2408E-A087-8D43-A497-FDCC91DD0CD2}" type="datetimeFigureOut">
               <a:rPr lang="en-US" smtClean="0"/>
-              <a:t>10/7/20</a:t>
+              <a:t>12/10/20</a:t>
             </a:fld>
             <a:endParaRPr lang="en-US"/>
           </a:p>
@@ -2014,7 +2014,7 @@
           <a:p>
             <a:fld id="{35E2408E-A087-8D43-A497-FDCC91DD0CD2}" type="datetimeFigureOut">
               <a:rPr lang="en-US" smtClean="0"/>
-              <a:t>10/7/20</a:t>
+              <a:t>12/10/20</a:t>
             </a:fld>
             <a:endParaRPr lang="en-US"/>
           </a:p>
@@ -2140,7 +2140,7 @@
           <a:p>
             <a:fld id="{35E2408E-A087-8D43-A497-FDCC91DD0CD2}" type="datetimeFigureOut">
               <a:rPr lang="en-US" smtClean="0"/>
-              <a:t>10/7/20</a:t>
+              <a:t>12/10/20</a:t>
             </a:fld>
             <a:endParaRPr lang="en-US"/>
           </a:p>
@@ -2391,7 +2391,7 @@
           <a:p>
             <a:fld id="{35E2408E-A087-8D43-A497-FDCC91DD0CD2}" type="datetimeFigureOut">
               <a:rPr lang="en-US" smtClean="0"/>
-              <a:t>10/7/20</a:t>
+              <a:t>12/10/20</a:t>
             </a:fld>
             <a:endParaRPr lang="en-US"/>
           </a:p>
@@ -2841,7 +2841,7 @@
           <a:p>
             <a:fld id="{35E2408E-A087-8D43-A497-FDCC91DD0CD2}" type="datetimeFigureOut">
               <a:rPr lang="en-US" smtClean="0"/>
-              <a:t>10/7/20</a:t>
+              <a:t>12/10/20</a:t>
             </a:fld>
             <a:endParaRPr lang="en-US"/>
           </a:p>
@@ -3168,7 +3168,7 @@
           <a:p>
             <a:fld id="{35E2408E-A087-8D43-A497-FDCC91DD0CD2}" type="datetimeFigureOut">
               <a:rPr lang="en-US" smtClean="0"/>
-              <a:t>10/7/20</a:t>
+              <a:t>12/10/20</a:t>
             </a:fld>
             <a:endParaRPr lang="en-US"/>
           </a:p>
@@ -10269,6 +10269,12 @@
             <a:r>
               <a:rPr lang="en-US" dirty="0"/>
               <a:t>Work with Bill to merge any changes (prior to errata vote at the FRM)</a:t>
+            </a:r>
+          </a:p>
+          <a:p>
+            <a:r>
+              <a:rPr lang="en-US" dirty="0"/>
+              <a:t>All PRs need to be posted by Jan 11 to give time for Bill to review and merge them.</a:t>
             </a:r>
           </a:p>
         </p:txBody>

</xml_diff>

<commit_message>
Add day to 2021-02 meeting
</commit_message>
<xml_diff>
--- a/slides/2020/09/2020-09-30-rcm-frm-procedures.pptx
+++ b/slides/2020/09/2020-09-30-rcm-frm-procedures.pptx
@@ -265,7 +265,7 @@
           <a:p>
             <a:fld id="{35E2408E-A087-8D43-A497-FDCC91DD0CD2}" type="datetimeFigureOut">
               <a:rPr lang="en-US" smtClean="0"/>
-              <a:t>12/10/20</a:t>
+              <a:t>12/16/20</a:t>
             </a:fld>
             <a:endParaRPr lang="en-US"/>
           </a:p>
@@ -476,7 +476,7 @@
           <a:p>
             <a:fld id="{35E2408E-A087-8D43-A497-FDCC91DD0CD2}" type="datetimeFigureOut">
               <a:rPr lang="en-US" smtClean="0"/>
-              <a:t>12/10/20</a:t>
+              <a:t>12/16/20</a:t>
             </a:fld>
             <a:endParaRPr lang="en-US"/>
           </a:p>
@@ -691,7 +691,7 @@
           <a:p>
             <a:fld id="{35E2408E-A087-8D43-A497-FDCC91DD0CD2}" type="datetimeFigureOut">
               <a:rPr lang="en-US" smtClean="0"/>
-              <a:t>12/10/20</a:t>
+              <a:t>12/16/20</a:t>
             </a:fld>
             <a:endParaRPr lang="en-US"/>
           </a:p>
@@ -892,7 +892,7 @@
           <a:p>
             <a:fld id="{35E2408E-A087-8D43-A497-FDCC91DD0CD2}" type="datetimeFigureOut">
               <a:rPr lang="en-US" smtClean="0"/>
-              <a:t>12/10/20</a:t>
+              <a:t>12/16/20</a:t>
             </a:fld>
             <a:endParaRPr lang="en-US"/>
           </a:p>
@@ -1171,7 +1171,7 @@
           <a:p>
             <a:fld id="{35E2408E-A087-8D43-A497-FDCC91DD0CD2}" type="datetimeFigureOut">
               <a:rPr lang="en-US" smtClean="0"/>
-              <a:t>12/10/20</a:t>
+              <a:t>12/16/20</a:t>
             </a:fld>
             <a:endParaRPr lang="en-US"/>
           </a:p>
@@ -1439,7 +1439,7 @@
           <a:p>
             <a:fld id="{35E2408E-A087-8D43-A497-FDCC91DD0CD2}" type="datetimeFigureOut">
               <a:rPr lang="en-US" smtClean="0"/>
-              <a:t>12/10/20</a:t>
+              <a:t>12/16/20</a:t>
             </a:fld>
             <a:endParaRPr lang="en-US"/>
           </a:p>
@@ -1860,7 +1860,7 @@
           <a:p>
             <a:fld id="{35E2408E-A087-8D43-A497-FDCC91DD0CD2}" type="datetimeFigureOut">
               <a:rPr lang="en-US" smtClean="0"/>
-              <a:t>12/10/20</a:t>
+              <a:t>12/16/20</a:t>
             </a:fld>
             <a:endParaRPr lang="en-US"/>
           </a:p>
@@ -2014,7 +2014,7 @@
           <a:p>
             <a:fld id="{35E2408E-A087-8D43-A497-FDCC91DD0CD2}" type="datetimeFigureOut">
               <a:rPr lang="en-US" smtClean="0"/>
-              <a:t>12/10/20</a:t>
+              <a:t>12/16/20</a:t>
             </a:fld>
             <a:endParaRPr lang="en-US"/>
           </a:p>
@@ -2140,7 +2140,7 @@
           <a:p>
             <a:fld id="{35E2408E-A087-8D43-A497-FDCC91DD0CD2}" type="datetimeFigureOut">
               <a:rPr lang="en-US" smtClean="0"/>
-              <a:t>12/10/20</a:t>
+              <a:t>12/16/20</a:t>
             </a:fld>
             <a:endParaRPr lang="en-US"/>
           </a:p>
@@ -2391,7 +2391,7 @@
           <a:p>
             <a:fld id="{35E2408E-A087-8D43-A497-FDCC91DD0CD2}" type="datetimeFigureOut">
               <a:rPr lang="en-US" smtClean="0"/>
-              <a:t>12/10/20</a:t>
+              <a:t>12/16/20</a:t>
             </a:fld>
             <a:endParaRPr lang="en-US"/>
           </a:p>
@@ -2841,7 +2841,7 @@
           <a:p>
             <a:fld id="{35E2408E-A087-8D43-A497-FDCC91DD0CD2}" type="datetimeFigureOut">
               <a:rPr lang="en-US" smtClean="0"/>
-              <a:t>12/10/20</a:t>
+              <a:t>12/16/20</a:t>
             </a:fld>
             <a:endParaRPr lang="en-US"/>
           </a:p>
@@ -3168,7 +3168,7 @@
           <a:p>
             <a:fld id="{35E2408E-A087-8D43-A497-FDCC91DD0CD2}" type="datetimeFigureOut">
               <a:rPr lang="en-US" smtClean="0"/>
-              <a:t>12/10/20</a:t>
+              <a:t>12/16/20</a:t>
             </a:fld>
             <a:endParaRPr lang="en-US"/>
           </a:p>
@@ -10225,7 +10225,7 @@
           <a:p>
             <a:r>
               <a:rPr lang="en-US" dirty="0"/>
-              <a:t>5 weeks before the FRM (Jan 18)</a:t>
+              <a:t>6 weeks before the FRM (Jan 11)</a:t>
             </a:r>
             <a:br>
               <a:rPr lang="en-US" dirty="0"/>

</xml_diff>